<commit_message>
added answers for exercise1
</commit_message>
<xml_diff>
--- a/Exercises.pptx
+++ b/Exercises.pptx
@@ -8,6 +8,12 @@
     <p:sldId id="256" r:id="rId3"/>
     <p:sldId id="257" r:id="rId4"/>
     <p:sldId id="258" r:id="rId5"/>
+    <p:sldId id="259" r:id="rId6"/>
+    <p:sldId id="260" r:id="rId7"/>
+    <p:sldId id="261" r:id="rId8"/>
+    <p:sldId id="262" r:id="rId9"/>
+    <p:sldId id="263" r:id="rId10"/>
+    <p:sldId id="264" r:id="rId11"/>
   </p:sldIdLst>
   <p:sldSz cx="12192000" cy="6858000"/>
   <p:notesSz cx="6858000" cy="9144000"/>
@@ -3206,7 +3212,7 @@
               <a:rPr lang="en-US" sz="2800">
                 <a:sym typeface="+mn-ea"/>
               </a:rPr>
-              <a:t>I/P : str1= 10 , str2=20</a:t>
+              <a:t>I/P : str1= “10 “, str2=”20”</a:t>
             </a:r>
             <a:endParaRPr lang="en-US" sz="2800"/>
           </a:p>
@@ -3216,7 +3222,7 @@
               <a:rPr lang="en-US" sz="2800">
                 <a:sym typeface="+mn-ea"/>
               </a:rPr>
-              <a:t>O/P : str1=20 , str2=10</a:t>
+              <a:t>O/P : str1=”20” , str2=”10”</a:t>
             </a:r>
             <a:endParaRPr lang="en-US" sz="2800">
               <a:sym typeface="+mn-ea"/>
@@ -3312,6 +3318,1113 @@
           </a:p>
           <a:p>
             <a:endParaRPr lang="en-US"/>
+          </a:p>
+        </p:txBody>
+      </p:sp>
+    </p:spTree>
+  </p:cSld>
+  <p:clrMapOvr>
+    <a:masterClrMapping/>
+  </p:clrMapOvr>
+</p:sld>
+</file>
+
+<file path=ppt/slides/slide4.xml><?xml version="1.0" encoding="utf-8"?>
+<p:sld xmlns:a="http://schemas.openxmlformats.org/drawingml/2006/main" xmlns:r="http://schemas.openxmlformats.org/officeDocument/2006/relationships" xmlns:p="http://schemas.openxmlformats.org/presentationml/2006/main">
+  <p:cSld>
+    <p:spTree>
+      <p:nvGrpSpPr>
+        <p:cNvPr id="1" name=""/>
+        <p:cNvGrpSpPr/>
+        <p:nvPr/>
+      </p:nvGrpSpPr>
+      <p:grpSpPr/>
+      <p:sp>
+        <p:nvSpPr>
+          <p:cNvPr id="2" name="Title 1"/>
+          <p:cNvSpPr>
+            <a:spLocks noGrp="1"/>
+          </p:cNvSpPr>
+          <p:nvPr>
+            <p:ph type="title"/>
+          </p:nvPr>
+        </p:nvSpPr>
+        <p:spPr/>
+        <p:txBody>
+          <a:bodyPr/>
+          <a:p>
+            <a:r>
+              <a:rPr lang="en-US"/>
+              <a:t>Exercise Set -1 : Answers</a:t>
+            </a:r>
+            <a:endParaRPr lang="en-US"/>
+          </a:p>
+        </p:txBody>
+      </p:sp>
+      <p:sp>
+        <p:nvSpPr>
+          <p:cNvPr id="3" name="Content Placeholder 2"/>
+          <p:cNvSpPr>
+            <a:spLocks noGrp="1"/>
+          </p:cNvSpPr>
+          <p:nvPr>
+            <p:ph idx="1"/>
+          </p:nvPr>
+        </p:nvSpPr>
+        <p:spPr/>
+        <p:txBody>
+          <a:bodyPr/>
+          <a:p>
+            <a:r>
+              <a:rPr lang="en-US" b="1">
+                <a:solidFill>
+                  <a:srgbClr val="FF0000"/>
+                </a:solidFill>
+                <a:sym typeface="+mn-ea"/>
+              </a:rPr>
+              <a:t>Reverse a List</a:t>
+            </a:r>
+            <a:endParaRPr lang="en-US" b="1">
+              <a:solidFill>
+                <a:srgbClr val="FF0000"/>
+              </a:solidFill>
+              <a:sym typeface="+mn-ea"/>
+            </a:endParaRPr>
+          </a:p>
+          <a:p>
+            <a:pPr lvl="1"/>
+            <a:r>
+              <a:rPr lang="en-US"/>
+              <a:t>Using Extended slicing</a:t>
+            </a:r>
+            <a:endParaRPr lang="en-US"/>
+          </a:p>
+          <a:p>
+            <a:pPr marL="457200" lvl="1" indent="0">
+              <a:buNone/>
+            </a:pPr>
+            <a:r>
+              <a:rPr lang="en-US"/>
+              <a:t>      I/P : list = [1,2,3,4,5]</a:t>
+            </a:r>
+            <a:endParaRPr lang="en-US"/>
+          </a:p>
+          <a:p>
+            <a:pPr marL="457200" lvl="1" indent="0">
+              <a:buNone/>
+            </a:pPr>
+            <a:r>
+              <a:rPr lang="en-US"/>
+              <a:t>      O/P:  </a:t>
+            </a:r>
+            <a:r>
+              <a:rPr lang="en-US">
+                <a:solidFill>
+                  <a:srgbClr val="FF0000"/>
+                </a:solidFill>
+              </a:rPr>
+              <a:t>print(list[::-1]) </a:t>
+            </a:r>
+            <a:r>
+              <a:rPr lang="en-US"/>
+              <a:t>  #[5,4,3,2,1]</a:t>
+            </a:r>
+            <a:endParaRPr lang="en-US"/>
+          </a:p>
+          <a:p>
+            <a:pPr marL="457200" lvl="1" indent="0">
+              <a:buNone/>
+            </a:pPr>
+            <a:endParaRPr lang="en-US"/>
+          </a:p>
+          <a:p>
+            <a:pPr lvl="1"/>
+            <a:r>
+              <a:rPr lang="en-US"/>
+              <a:t>Using Reverse method</a:t>
+            </a:r>
+            <a:endParaRPr lang="en-US"/>
+          </a:p>
+          <a:p>
+            <a:pPr marL="457200" lvl="1" indent="0">
+              <a:buNone/>
+            </a:pPr>
+            <a:r>
+              <a:rPr lang="en-US"/>
+              <a:t>      </a:t>
+            </a:r>
+            <a:r>
+              <a:rPr lang="en-US">
+                <a:sym typeface="+mn-ea"/>
+              </a:rPr>
+              <a:t>I/P : list = [1,2,3,4,5]</a:t>
+            </a:r>
+            <a:endParaRPr lang="en-US">
+              <a:sym typeface="+mn-ea"/>
+            </a:endParaRPr>
+          </a:p>
+          <a:p>
+            <a:pPr marL="457200" lvl="1" indent="0">
+              <a:buNone/>
+            </a:pPr>
+            <a:r>
+              <a:rPr lang="en-US">
+                <a:sym typeface="+mn-ea"/>
+              </a:rPr>
+              <a:t>      O/P :  </a:t>
+            </a:r>
+            <a:r>
+              <a:rPr lang="en-US">
+                <a:solidFill>
+                  <a:srgbClr val="FF0000"/>
+                </a:solidFill>
+                <a:sym typeface="+mn-ea"/>
+              </a:rPr>
+              <a:t>list.reverse()</a:t>
+            </a:r>
+            <a:endParaRPr lang="en-US">
+              <a:solidFill>
+                <a:srgbClr val="FF0000"/>
+              </a:solidFill>
+              <a:sym typeface="+mn-ea"/>
+            </a:endParaRPr>
+          </a:p>
+          <a:p>
+            <a:pPr marL="457200" lvl="1" indent="0">
+              <a:buNone/>
+            </a:pPr>
+            <a:r>
+              <a:rPr lang="en-US">
+                <a:solidFill>
+                  <a:srgbClr val="FF0000"/>
+                </a:solidFill>
+                <a:sym typeface="+mn-ea"/>
+              </a:rPr>
+              <a:t>                 print(list)</a:t>
+            </a:r>
+            <a:r>
+              <a:rPr lang="en-US">
+                <a:sym typeface="+mn-ea"/>
+              </a:rPr>
+              <a:t>   # [5,4,3,3,2,1]</a:t>
+            </a:r>
+            <a:endParaRPr lang="en-US"/>
+          </a:p>
+          <a:p>
+            <a:pPr lvl="1"/>
+            <a:endParaRPr lang="en-US"/>
+          </a:p>
+        </p:txBody>
+      </p:sp>
+    </p:spTree>
+  </p:cSld>
+  <p:clrMapOvr>
+    <a:masterClrMapping/>
+  </p:clrMapOvr>
+</p:sld>
+</file>
+
+<file path=ppt/slides/slide5.xml><?xml version="1.0" encoding="utf-8"?>
+<p:sld xmlns:a="http://schemas.openxmlformats.org/drawingml/2006/main" xmlns:r="http://schemas.openxmlformats.org/officeDocument/2006/relationships" xmlns:p="http://schemas.openxmlformats.org/presentationml/2006/main">
+  <p:cSld>
+    <p:spTree>
+      <p:nvGrpSpPr>
+        <p:cNvPr id="1" name=""/>
+        <p:cNvGrpSpPr/>
+        <p:nvPr/>
+      </p:nvGrpSpPr>
+      <p:grpSpPr/>
+      <p:sp>
+        <p:nvSpPr>
+          <p:cNvPr id="2" name="Title 1"/>
+          <p:cNvSpPr>
+            <a:spLocks noGrp="1"/>
+          </p:cNvSpPr>
+          <p:nvPr>
+            <p:ph type="title"/>
+          </p:nvPr>
+        </p:nvSpPr>
+        <p:spPr/>
+        <p:txBody>
+          <a:bodyPr>
+            <a:normAutofit fontScale="90000"/>
+          </a:bodyPr>
+          <a:p>
+            <a:r>
+              <a:rPr lang="en-US">
+                <a:sym typeface="+mn-ea"/>
+              </a:rPr>
+              <a:t>Exercise Set -1 : Answers</a:t>
+            </a:r>
+            <a:br>
+              <a:rPr lang="en-US"/>
+            </a:br>
+            <a:endParaRPr lang="en-US"/>
+          </a:p>
+        </p:txBody>
+      </p:sp>
+      <p:sp>
+        <p:nvSpPr>
+          <p:cNvPr id="3" name="Content Placeholder 2"/>
+          <p:cNvSpPr>
+            <a:spLocks noGrp="1"/>
+          </p:cNvSpPr>
+          <p:nvPr>
+            <p:ph idx="1"/>
+          </p:nvPr>
+        </p:nvSpPr>
+        <p:spPr/>
+        <p:txBody>
+          <a:bodyPr/>
+          <a:p>
+            <a:pPr lvl="0"/>
+            <a:r>
+              <a:rPr lang="en-US" sz="2800" b="1">
+                <a:solidFill>
+                  <a:srgbClr val="FF0000"/>
+                </a:solidFill>
+                <a:sym typeface="+mn-ea"/>
+              </a:rPr>
+              <a:t>Reverse each word in string</a:t>
+            </a:r>
+            <a:endParaRPr lang="en-US" sz="2800" b="1">
+              <a:solidFill>
+                <a:srgbClr val="FF0000"/>
+              </a:solidFill>
+            </a:endParaRPr>
+          </a:p>
+          <a:p>
+            <a:pPr lvl="1"/>
+            <a:r>
+              <a:rPr lang="en-US" sz="2800">
+                <a:sym typeface="+mn-ea"/>
+              </a:rPr>
+              <a:t>I/P :  str = “This is my string”</a:t>
+            </a:r>
+            <a:endParaRPr lang="en-US" sz="2800"/>
+          </a:p>
+          <a:p>
+            <a:pPr lvl="1"/>
+            <a:r>
+              <a:rPr lang="en-US" sz="2800">
+                <a:sym typeface="+mn-ea"/>
+              </a:rPr>
+              <a:t>O/P : “sihT si ym gnirts”</a:t>
+            </a:r>
+            <a:endParaRPr lang="en-US" sz="2800"/>
+          </a:p>
+          <a:p>
+            <a:pPr lvl="1"/>
+            <a:endParaRPr lang="en-US"/>
+          </a:p>
+          <a:p>
+            <a:pPr marL="457200" lvl="1" indent="0">
+              <a:buNone/>
+            </a:pPr>
+            <a:r>
+              <a:rPr lang="en-US">
+                <a:solidFill>
+                  <a:srgbClr val="FF0000"/>
+                </a:solidFill>
+              </a:rPr>
+              <a:t>str = "This is my string"</a:t>
+            </a:r>
+            <a:endParaRPr lang="en-US">
+              <a:solidFill>
+                <a:srgbClr val="FF0000"/>
+              </a:solidFill>
+            </a:endParaRPr>
+          </a:p>
+          <a:p>
+            <a:pPr marL="457200" lvl="1" indent="0">
+              <a:buNone/>
+            </a:pPr>
+            <a:r>
+              <a:rPr lang="en-US">
+                <a:solidFill>
+                  <a:srgbClr val="FF0000"/>
+                </a:solidFill>
+              </a:rPr>
+              <a:t>str2 = ""</a:t>
+            </a:r>
+            <a:endParaRPr lang="en-US">
+              <a:solidFill>
+                <a:srgbClr val="FF0000"/>
+              </a:solidFill>
+            </a:endParaRPr>
+          </a:p>
+          <a:p>
+            <a:pPr marL="457200" lvl="1" indent="0">
+              <a:buNone/>
+            </a:pPr>
+            <a:r>
+              <a:rPr lang="en-US">
+                <a:solidFill>
+                  <a:srgbClr val="FF0000"/>
+                </a:solidFill>
+              </a:rPr>
+              <a:t>for word in str.split(" "):</a:t>
+            </a:r>
+            <a:endParaRPr lang="en-US">
+              <a:solidFill>
+                <a:srgbClr val="FF0000"/>
+              </a:solidFill>
+            </a:endParaRPr>
+          </a:p>
+          <a:p>
+            <a:pPr marL="457200" lvl="1" indent="0">
+              <a:buNone/>
+            </a:pPr>
+            <a:r>
+              <a:rPr lang="en-US">
+                <a:solidFill>
+                  <a:srgbClr val="FF0000"/>
+                </a:solidFill>
+              </a:rPr>
+              <a:t>    str2 = str2 + " " + word[::-1]</a:t>
+            </a:r>
+            <a:endParaRPr lang="en-US">
+              <a:solidFill>
+                <a:srgbClr val="FF0000"/>
+              </a:solidFill>
+            </a:endParaRPr>
+          </a:p>
+          <a:p>
+            <a:pPr marL="457200" lvl="1" indent="0">
+              <a:buNone/>
+            </a:pPr>
+            <a:endParaRPr lang="en-US">
+              <a:solidFill>
+                <a:srgbClr val="FF0000"/>
+              </a:solidFill>
+            </a:endParaRPr>
+          </a:p>
+          <a:p>
+            <a:pPr marL="457200" lvl="1" indent="0">
+              <a:buNone/>
+            </a:pPr>
+            <a:r>
+              <a:rPr lang="en-US">
+                <a:solidFill>
+                  <a:srgbClr val="FF0000"/>
+                </a:solidFill>
+              </a:rPr>
+              <a:t>print(str2)   #sihT si ym gnirts</a:t>
+            </a:r>
+            <a:endParaRPr lang="en-US">
+              <a:solidFill>
+                <a:srgbClr val="FF0000"/>
+              </a:solidFill>
+            </a:endParaRPr>
+          </a:p>
+        </p:txBody>
+      </p:sp>
+    </p:spTree>
+  </p:cSld>
+  <p:clrMapOvr>
+    <a:masterClrMapping/>
+  </p:clrMapOvr>
+</p:sld>
+</file>
+
+<file path=ppt/slides/slide6.xml><?xml version="1.0" encoding="utf-8"?>
+<p:sld xmlns:a="http://schemas.openxmlformats.org/drawingml/2006/main" xmlns:r="http://schemas.openxmlformats.org/officeDocument/2006/relationships" xmlns:p="http://schemas.openxmlformats.org/presentationml/2006/main">
+  <p:cSld>
+    <p:spTree>
+      <p:nvGrpSpPr>
+        <p:cNvPr id="1" name=""/>
+        <p:cNvGrpSpPr/>
+        <p:nvPr/>
+      </p:nvGrpSpPr>
+      <p:grpSpPr/>
+      <p:sp>
+        <p:nvSpPr>
+          <p:cNvPr id="2" name="Title 1"/>
+          <p:cNvSpPr>
+            <a:spLocks noGrp="1"/>
+          </p:cNvSpPr>
+          <p:nvPr>
+            <p:ph type="title"/>
+          </p:nvPr>
+        </p:nvSpPr>
+        <p:spPr/>
+        <p:txBody>
+          <a:bodyPr/>
+          <a:p>
+            <a:r>
+              <a:rPr lang="en-US">
+                <a:sym typeface="+mn-ea"/>
+              </a:rPr>
+              <a:t>Exercise Set -1 : Answers</a:t>
+            </a:r>
+            <a:endParaRPr lang="en-US"/>
+          </a:p>
+        </p:txBody>
+      </p:sp>
+      <p:sp>
+        <p:nvSpPr>
+          <p:cNvPr id="3" name="Content Placeholder 2"/>
+          <p:cNvSpPr>
+            <a:spLocks noGrp="1"/>
+          </p:cNvSpPr>
+          <p:nvPr>
+            <p:ph idx="1"/>
+          </p:nvPr>
+        </p:nvSpPr>
+        <p:spPr/>
+        <p:txBody>
+          <a:bodyPr/>
+          <a:p>
+            <a:pPr lvl="0"/>
+            <a:r>
+              <a:rPr lang="en-US" sz="2800" b="1">
+                <a:solidFill>
+                  <a:srgbClr val="FF0000"/>
+                </a:solidFill>
+                <a:sym typeface="+mn-ea"/>
+              </a:rPr>
+              <a:t>Swap numbers without using temp variable</a:t>
+            </a:r>
+            <a:endParaRPr lang="en-US" sz="2800" b="1">
+              <a:solidFill>
+                <a:srgbClr val="FF0000"/>
+              </a:solidFill>
+            </a:endParaRPr>
+          </a:p>
+          <a:p>
+            <a:pPr lvl="1"/>
+            <a:r>
+              <a:rPr lang="en-US" sz="2800">
+                <a:sym typeface="+mn-ea"/>
+              </a:rPr>
+              <a:t>I/P : num1 = 10 , num2 =20</a:t>
+            </a:r>
+            <a:endParaRPr lang="en-US" sz="2800"/>
+          </a:p>
+          <a:p>
+            <a:pPr lvl="1"/>
+            <a:r>
+              <a:rPr lang="en-US" sz="2800">
+                <a:sym typeface="+mn-ea"/>
+              </a:rPr>
+              <a:t>O/P : num1=20 , num2 =10</a:t>
+            </a:r>
+            <a:endParaRPr lang="en-US" sz="2800">
+              <a:sym typeface="+mn-ea"/>
+            </a:endParaRPr>
+          </a:p>
+          <a:p>
+            <a:pPr lvl="1"/>
+            <a:endParaRPr lang="en-US" sz="2800">
+              <a:sym typeface="+mn-ea"/>
+            </a:endParaRPr>
+          </a:p>
+          <a:p>
+            <a:pPr lvl="1"/>
+            <a:r>
+              <a:rPr lang="en-US" sz="2800">
+                <a:solidFill>
+                  <a:srgbClr val="FF0000"/>
+                </a:solidFill>
+              </a:rPr>
+              <a:t>num1 = num1+num2</a:t>
+            </a:r>
+            <a:endParaRPr lang="en-US" sz="2800">
+              <a:solidFill>
+                <a:srgbClr val="FF0000"/>
+              </a:solidFill>
+            </a:endParaRPr>
+          </a:p>
+          <a:p>
+            <a:pPr lvl="1"/>
+            <a:r>
+              <a:rPr lang="en-US" sz="2800">
+                <a:solidFill>
+                  <a:srgbClr val="FF0000"/>
+                </a:solidFill>
+              </a:rPr>
+              <a:t>num2 = num1 -num2</a:t>
+            </a:r>
+            <a:endParaRPr lang="en-US" sz="2800">
+              <a:solidFill>
+                <a:srgbClr val="FF0000"/>
+              </a:solidFill>
+            </a:endParaRPr>
+          </a:p>
+          <a:p>
+            <a:pPr lvl="1"/>
+            <a:r>
+              <a:rPr lang="en-US" sz="2800">
+                <a:solidFill>
+                  <a:srgbClr val="FF0000"/>
+                </a:solidFill>
+              </a:rPr>
+              <a:t>num1 = num1-num2</a:t>
+            </a:r>
+            <a:endParaRPr lang="en-US" sz="2800">
+              <a:solidFill>
+                <a:srgbClr val="FF0000"/>
+              </a:solidFill>
+            </a:endParaRPr>
+          </a:p>
+          <a:p>
+            <a:endParaRPr lang="en-US" sz="2800">
+              <a:solidFill>
+                <a:srgbClr val="FF0000"/>
+              </a:solidFill>
+            </a:endParaRPr>
+          </a:p>
+        </p:txBody>
+      </p:sp>
+    </p:spTree>
+  </p:cSld>
+  <p:clrMapOvr>
+    <a:masterClrMapping/>
+  </p:clrMapOvr>
+</p:sld>
+</file>
+
+<file path=ppt/slides/slide7.xml><?xml version="1.0" encoding="utf-8"?>
+<p:sld xmlns:a="http://schemas.openxmlformats.org/drawingml/2006/main" xmlns:r="http://schemas.openxmlformats.org/officeDocument/2006/relationships" xmlns:p="http://schemas.openxmlformats.org/presentationml/2006/main">
+  <p:cSld>
+    <p:spTree>
+      <p:nvGrpSpPr>
+        <p:cNvPr id="1" name=""/>
+        <p:cNvGrpSpPr/>
+        <p:nvPr/>
+      </p:nvGrpSpPr>
+      <p:grpSpPr/>
+      <p:sp>
+        <p:nvSpPr>
+          <p:cNvPr id="2" name="Title 1"/>
+          <p:cNvSpPr>
+            <a:spLocks noGrp="1"/>
+          </p:cNvSpPr>
+          <p:nvPr>
+            <p:ph type="title"/>
+          </p:nvPr>
+        </p:nvSpPr>
+        <p:spPr/>
+        <p:txBody>
+          <a:bodyPr>
+            <a:normAutofit/>
+          </a:bodyPr>
+          <a:p>
+            <a:r>
+              <a:rPr lang="en-US">
+                <a:sym typeface="+mn-ea"/>
+              </a:rPr>
+              <a:t>Exercise Set -1 : Answers</a:t>
+            </a:r>
+            <a:endParaRPr lang="en-US"/>
+          </a:p>
+        </p:txBody>
+      </p:sp>
+      <p:sp>
+        <p:nvSpPr>
+          <p:cNvPr id="3" name="Content Placeholder 2"/>
+          <p:cNvSpPr>
+            <a:spLocks noGrp="1"/>
+          </p:cNvSpPr>
+          <p:nvPr>
+            <p:ph idx="1"/>
+          </p:nvPr>
+        </p:nvSpPr>
+        <p:spPr/>
+        <p:txBody>
+          <a:bodyPr/>
+          <a:p>
+            <a:pPr lvl="0"/>
+            <a:r>
+              <a:rPr lang="en-US" sz="2800" b="1">
+                <a:solidFill>
+                  <a:srgbClr val="FF0000"/>
+                </a:solidFill>
+                <a:sym typeface="+mn-ea"/>
+              </a:rPr>
+              <a:t>Swap strings without using temp variable</a:t>
+            </a:r>
+            <a:endParaRPr lang="en-US" sz="2800" b="1">
+              <a:solidFill>
+                <a:srgbClr val="FF0000"/>
+              </a:solidFill>
+            </a:endParaRPr>
+          </a:p>
+          <a:p>
+            <a:pPr lvl="1"/>
+            <a:r>
+              <a:rPr lang="en-US" sz="2800">
+                <a:sym typeface="+mn-ea"/>
+              </a:rPr>
+              <a:t>I/P : str1= “10 “, str2=”20”</a:t>
+            </a:r>
+            <a:endParaRPr lang="en-US" sz="2800"/>
+          </a:p>
+          <a:p>
+            <a:pPr lvl="1"/>
+            <a:r>
+              <a:rPr lang="en-US" sz="2800">
+                <a:sym typeface="+mn-ea"/>
+              </a:rPr>
+              <a:t>O/P : str1=”20” , str2=”10”</a:t>
+            </a:r>
+            <a:endParaRPr lang="en-US" sz="2800">
+              <a:sym typeface="+mn-ea"/>
+            </a:endParaRPr>
+          </a:p>
+          <a:p>
+            <a:pPr lvl="1"/>
+            <a:endParaRPr lang="en-US"/>
+          </a:p>
+          <a:p>
+            <a:pPr marL="457200" lvl="1" indent="0">
+              <a:buNone/>
+            </a:pPr>
+            <a:r>
+              <a:rPr lang="en-US">
+                <a:solidFill>
+                  <a:srgbClr val="FF0000"/>
+                </a:solidFill>
+              </a:rPr>
+              <a:t>str1 = str1+str2   </a:t>
+            </a:r>
+            <a:endParaRPr lang="en-US">
+              <a:solidFill>
+                <a:srgbClr val="FF0000"/>
+              </a:solidFill>
+            </a:endParaRPr>
+          </a:p>
+          <a:p>
+            <a:pPr marL="457200" lvl="1" indent="0">
+              <a:buNone/>
+            </a:pPr>
+            <a:r>
+              <a:rPr lang="en-US">
+                <a:solidFill>
+                  <a:srgbClr val="FF0000"/>
+                </a:solidFill>
+              </a:rPr>
+              <a:t>str2 = str1[0:len(str1)-len(str2)]</a:t>
+            </a:r>
+            <a:endParaRPr lang="en-US">
+              <a:solidFill>
+                <a:srgbClr val="FF0000"/>
+              </a:solidFill>
+            </a:endParaRPr>
+          </a:p>
+          <a:p>
+            <a:pPr marL="457200" lvl="1" indent="0">
+              <a:buNone/>
+            </a:pPr>
+            <a:r>
+              <a:rPr lang="en-US">
+                <a:solidFill>
+                  <a:srgbClr val="FF0000"/>
+                </a:solidFill>
+              </a:rPr>
+              <a:t>str1 = str1[len(str2):]</a:t>
+            </a:r>
+            <a:endParaRPr lang="en-US">
+              <a:solidFill>
+                <a:srgbClr val="FF0000"/>
+              </a:solidFill>
+            </a:endParaRPr>
+          </a:p>
+          <a:p>
+            <a:pPr marL="457200" lvl="1" indent="0">
+              <a:buNone/>
+            </a:pPr>
+            <a:endParaRPr lang="en-US">
+              <a:solidFill>
+                <a:srgbClr val="FF0000"/>
+              </a:solidFill>
+            </a:endParaRPr>
+          </a:p>
+          <a:p>
+            <a:pPr marL="457200" lvl="1" indent="0">
+              <a:buNone/>
+            </a:pPr>
+            <a:r>
+              <a:rPr lang="en-US">
+                <a:solidFill>
+                  <a:srgbClr val="FF0000"/>
+                </a:solidFill>
+              </a:rPr>
+              <a:t>print(str1)</a:t>
+            </a:r>
+            <a:endParaRPr lang="en-US">
+              <a:solidFill>
+                <a:srgbClr val="FF0000"/>
+              </a:solidFill>
+            </a:endParaRPr>
+          </a:p>
+          <a:p>
+            <a:pPr marL="457200" lvl="1" indent="0">
+              <a:buNone/>
+            </a:pPr>
+            <a:r>
+              <a:rPr lang="en-US">
+                <a:solidFill>
+                  <a:srgbClr val="FF0000"/>
+                </a:solidFill>
+              </a:rPr>
+              <a:t>print(str2)</a:t>
+            </a:r>
+            <a:endParaRPr lang="en-US">
+              <a:solidFill>
+                <a:srgbClr val="FF0000"/>
+              </a:solidFill>
+            </a:endParaRPr>
+          </a:p>
+        </p:txBody>
+      </p:sp>
+    </p:spTree>
+  </p:cSld>
+  <p:clrMapOvr>
+    <a:masterClrMapping/>
+  </p:clrMapOvr>
+</p:sld>
+</file>
+
+<file path=ppt/slides/slide8.xml><?xml version="1.0" encoding="utf-8"?>
+<p:sld xmlns:a="http://schemas.openxmlformats.org/drawingml/2006/main" xmlns:r="http://schemas.openxmlformats.org/officeDocument/2006/relationships" xmlns:p="http://schemas.openxmlformats.org/presentationml/2006/main">
+  <p:cSld>
+    <p:spTree>
+      <p:nvGrpSpPr>
+        <p:cNvPr id="1" name=""/>
+        <p:cNvGrpSpPr/>
+        <p:nvPr/>
+      </p:nvGrpSpPr>
+      <p:grpSpPr/>
+      <p:sp>
+        <p:nvSpPr>
+          <p:cNvPr id="2" name="Title 1"/>
+          <p:cNvSpPr>
+            <a:spLocks noGrp="1"/>
+          </p:cNvSpPr>
+          <p:nvPr>
+            <p:ph type="title"/>
+          </p:nvPr>
+        </p:nvSpPr>
+        <p:spPr/>
+        <p:txBody>
+          <a:bodyPr>
+            <a:normAutofit/>
+          </a:bodyPr>
+          <a:p>
+            <a:r>
+              <a:rPr lang="en-US">
+                <a:sym typeface="+mn-ea"/>
+              </a:rPr>
+              <a:t>Exercise Set -1 : Answers</a:t>
+            </a:r>
+            <a:endParaRPr lang="en-US"/>
+          </a:p>
+        </p:txBody>
+      </p:sp>
+      <p:sp>
+        <p:nvSpPr>
+          <p:cNvPr id="3" name="Content Placeholder 2"/>
+          <p:cNvSpPr>
+            <a:spLocks noGrp="1"/>
+          </p:cNvSpPr>
+          <p:nvPr>
+            <p:ph idx="1"/>
+          </p:nvPr>
+        </p:nvSpPr>
+        <p:spPr/>
+        <p:txBody>
+          <a:bodyPr/>
+          <a:p>
+            <a:pPr lvl="0" algn="l">
+              <a:buClrTx/>
+              <a:buSzTx/>
+            </a:pPr>
+            <a:r>
+              <a:rPr lang="en-US" sz="2800" b="1">
+                <a:solidFill>
+                  <a:srgbClr val="FF0000"/>
+                </a:solidFill>
+                <a:sym typeface="+mn-ea"/>
+              </a:rPr>
+              <a:t>Sort List of numbers:</a:t>
+            </a:r>
+            <a:endParaRPr lang="en-US" sz="2800" b="1">
+              <a:solidFill>
+                <a:srgbClr val="FF0000"/>
+              </a:solidFill>
+              <a:sym typeface="+mn-ea"/>
+            </a:endParaRPr>
+          </a:p>
+          <a:p>
+            <a:pPr lvl="1"/>
+            <a:r>
+              <a:rPr lang="en-US" sz="2800">
+                <a:sym typeface="+mn-ea"/>
+              </a:rPr>
+              <a:t>I/P : list = [2,4,1,5,7,5,4,9]</a:t>
+            </a:r>
+            <a:endParaRPr lang="en-US" sz="2800">
+              <a:sym typeface="+mn-ea"/>
+            </a:endParaRPr>
+          </a:p>
+          <a:p>
+            <a:pPr lvl="1"/>
+            <a:r>
+              <a:rPr lang="en-US" sz="2800">
+                <a:sym typeface="+mn-ea"/>
+              </a:rPr>
+              <a:t>O/P : list = [12,4,4,5,5,7,9]</a:t>
+            </a:r>
+            <a:endParaRPr lang="en-US" sz="2800">
+              <a:sym typeface="+mn-ea"/>
+            </a:endParaRPr>
+          </a:p>
+          <a:p>
+            <a:pPr lvl="1"/>
+            <a:endParaRPr lang="en-US"/>
+          </a:p>
+          <a:p>
+            <a:pPr lvl="1"/>
+            <a:r>
+              <a:rPr lang="en-US" b="1">
+                <a:solidFill>
+                  <a:srgbClr val="FF0000"/>
+                </a:solidFill>
+              </a:rPr>
+              <a:t>Using Sort Method</a:t>
+            </a:r>
+            <a:endParaRPr lang="en-US" b="1">
+              <a:solidFill>
+                <a:srgbClr val="FF0000"/>
+              </a:solidFill>
+            </a:endParaRPr>
+          </a:p>
+          <a:p>
+            <a:pPr marL="457200" lvl="1" indent="0">
+              <a:buNone/>
+            </a:pPr>
+            <a:r>
+              <a:rPr lang="en-US">
+                <a:solidFill>
+                  <a:srgbClr val="FF0000"/>
+                </a:solidFill>
+              </a:rPr>
+              <a:t>list.sort()</a:t>
+            </a:r>
+            <a:endParaRPr lang="en-US">
+              <a:solidFill>
+                <a:srgbClr val="FF0000"/>
+              </a:solidFill>
+            </a:endParaRPr>
+          </a:p>
+          <a:p>
+            <a:pPr marL="457200" lvl="1" indent="0">
+              <a:buNone/>
+            </a:pPr>
+            <a:r>
+              <a:rPr lang="en-US">
+                <a:solidFill>
+                  <a:srgbClr val="FF0000"/>
+                </a:solidFill>
+              </a:rPr>
+              <a:t>print(list)</a:t>
+            </a:r>
+            <a:endParaRPr lang="en-US">
+              <a:solidFill>
+                <a:srgbClr val="FF0000"/>
+              </a:solidFill>
+            </a:endParaRPr>
+          </a:p>
+          <a:p>
+            <a:pPr marL="457200" lvl="1" indent="0">
+              <a:buNone/>
+            </a:pPr>
+            <a:endParaRPr lang="en-US">
+              <a:solidFill>
+                <a:srgbClr val="FF0000"/>
+              </a:solidFill>
+            </a:endParaRPr>
+          </a:p>
+          <a:p>
+            <a:pPr lvl="1"/>
+            <a:r>
+              <a:rPr lang="en-US" b="1">
+                <a:solidFill>
+                  <a:srgbClr val="FF0000"/>
+                </a:solidFill>
+              </a:rPr>
+              <a:t>Using Sorted Method</a:t>
+            </a:r>
+            <a:endParaRPr lang="en-US" b="1">
+              <a:solidFill>
+                <a:srgbClr val="FF0000"/>
+              </a:solidFill>
+            </a:endParaRPr>
+          </a:p>
+          <a:p>
+            <a:pPr marL="457200" lvl="1" indent="0">
+              <a:buNone/>
+            </a:pPr>
+            <a:r>
+              <a:rPr lang="en-US">
+                <a:solidFill>
+                  <a:srgbClr val="FF0000"/>
+                </a:solidFill>
+              </a:rPr>
+              <a:t>print(sorted(list))</a:t>
+            </a:r>
+            <a:endParaRPr lang="en-US">
+              <a:solidFill>
+                <a:srgbClr val="FF0000"/>
+              </a:solidFill>
+            </a:endParaRPr>
+          </a:p>
+          <a:p>
+            <a:pPr marL="457200" lvl="1" indent="0">
+              <a:buNone/>
+            </a:pPr>
+            <a:endParaRPr lang="en-US">
+              <a:solidFill>
+                <a:srgbClr val="FF0000"/>
+              </a:solidFill>
+            </a:endParaRPr>
+          </a:p>
+          <a:p>
+            <a:pPr marL="457200" lvl="1" indent="0">
+              <a:buNone/>
+            </a:pPr>
+            <a:endParaRPr lang="en-US">
+              <a:solidFill>
+                <a:srgbClr val="FF0000"/>
+              </a:solidFill>
+            </a:endParaRPr>
+          </a:p>
+        </p:txBody>
+      </p:sp>
+    </p:spTree>
+  </p:cSld>
+  <p:clrMapOvr>
+    <a:masterClrMapping/>
+  </p:clrMapOvr>
+</p:sld>
+</file>
+
+<file path=ppt/slides/slide9.xml><?xml version="1.0" encoding="utf-8"?>
+<p:sld xmlns:a="http://schemas.openxmlformats.org/drawingml/2006/main" xmlns:r="http://schemas.openxmlformats.org/officeDocument/2006/relationships" xmlns:p="http://schemas.openxmlformats.org/presentationml/2006/main">
+  <p:cSld>
+    <p:spTree>
+      <p:nvGrpSpPr>
+        <p:cNvPr id="1" name=""/>
+        <p:cNvGrpSpPr/>
+        <p:nvPr/>
+      </p:nvGrpSpPr>
+      <p:grpSpPr/>
+      <p:sp>
+        <p:nvSpPr>
+          <p:cNvPr id="2" name="Title 1"/>
+          <p:cNvSpPr>
+            <a:spLocks noGrp="1"/>
+          </p:cNvSpPr>
+          <p:nvPr>
+            <p:ph type="title"/>
+          </p:nvPr>
+        </p:nvSpPr>
+        <p:spPr/>
+        <p:txBody>
+          <a:bodyPr>
+            <a:normAutofit/>
+          </a:bodyPr>
+          <a:p>
+            <a:r>
+              <a:rPr lang="en-US">
+                <a:sym typeface="+mn-ea"/>
+              </a:rPr>
+              <a:t>Exercise Set -1 : Answers</a:t>
+            </a:r>
+            <a:endParaRPr lang="en-US"/>
+          </a:p>
+        </p:txBody>
+      </p:sp>
+      <p:sp>
+        <p:nvSpPr>
+          <p:cNvPr id="3" name="Content Placeholder 2"/>
+          <p:cNvSpPr>
+            <a:spLocks noGrp="1"/>
+          </p:cNvSpPr>
+          <p:nvPr>
+            <p:ph idx="1"/>
+          </p:nvPr>
+        </p:nvSpPr>
+        <p:spPr/>
+        <p:txBody>
+          <a:bodyPr/>
+          <a:p>
+            <a:pPr lvl="0" algn="l">
+              <a:buClrTx/>
+              <a:buSzTx/>
+            </a:pPr>
+            <a:r>
+              <a:rPr lang="en-US" sz="2800" b="1">
+                <a:solidFill>
+                  <a:srgbClr val="FF0000"/>
+                </a:solidFill>
+                <a:sym typeface="+mn-ea"/>
+              </a:rPr>
+              <a:t>Remove duplicates from tuples</a:t>
+            </a:r>
+            <a:endParaRPr lang="en-US" sz="2800" b="1">
+              <a:solidFill>
+                <a:srgbClr val="FF0000"/>
+              </a:solidFill>
+              <a:sym typeface="+mn-ea"/>
+            </a:endParaRPr>
+          </a:p>
+          <a:p>
+            <a:pPr lvl="1"/>
+            <a:r>
+              <a:rPr lang="en-US" sz="2800">
+                <a:sym typeface="+mn-ea"/>
+              </a:rPr>
+              <a:t>I/P : val = (1,2,3,3,4,1,7,9)</a:t>
+            </a:r>
+            <a:endParaRPr lang="en-US" sz="2800">
+              <a:sym typeface="+mn-ea"/>
+            </a:endParaRPr>
+          </a:p>
+          <a:p>
+            <a:pPr lvl="1"/>
+            <a:r>
+              <a:rPr lang="en-US" sz="2800">
+                <a:sym typeface="+mn-ea"/>
+              </a:rPr>
+              <a:t>O/P :val = (1,2,3,4,7,9)</a:t>
+            </a:r>
+            <a:endParaRPr lang="en-US" sz="2800">
+              <a:sym typeface="+mn-ea"/>
+            </a:endParaRPr>
+          </a:p>
+          <a:p>
+            <a:pPr lvl="1"/>
+            <a:endParaRPr lang="en-US"/>
+          </a:p>
+          <a:p>
+            <a:pPr marL="457200" lvl="1" indent="0">
+              <a:buNone/>
+            </a:pPr>
+            <a:r>
+              <a:rPr lang="en-US">
+                <a:solidFill>
+                  <a:srgbClr val="FF0000"/>
+                </a:solidFill>
+              </a:rPr>
+              <a:t>print(set(val))</a:t>
+            </a:r>
+            <a:endParaRPr lang="en-US">
+              <a:solidFill>
+                <a:srgbClr val="FF0000"/>
+              </a:solidFill>
+            </a:endParaRPr>
           </a:p>
         </p:txBody>
       </p:sp>

</xml_diff>